<commit_message>
Added profiler to the macro editor.
</commit_message>
<xml_diff>
--- a/src/python/ccpn/ui/gui/modules/macroEditorUtil/editorIcons/raw_icons.pptx
+++ b/src/python/ccpn/ui/gui/modules/macroEditorUtil/editorIcons/raw_icons.pptx
@@ -280,7 +280,7 @@
           <a:p>
             <a:fld id="{4E2C61A7-258B-BC4C-BFB2-CEA5AF03893F}" type="datetimeFigureOut">
               <a:rPr lang="en-GB" smtClean="0"/>
-              <a:t>04/08/2021</a:t>
+              <a:t>06/08/2021</a:t>
             </a:fld>
             <a:endParaRPr lang="en-GB"/>
           </a:p>
@@ -478,7 +478,7 @@
           <a:p>
             <a:fld id="{4E2C61A7-258B-BC4C-BFB2-CEA5AF03893F}" type="datetimeFigureOut">
               <a:rPr lang="en-GB" smtClean="0"/>
-              <a:t>04/08/2021</a:t>
+              <a:t>06/08/2021</a:t>
             </a:fld>
             <a:endParaRPr lang="en-GB"/>
           </a:p>
@@ -686,7 +686,7 @@
           <a:p>
             <a:fld id="{4E2C61A7-258B-BC4C-BFB2-CEA5AF03893F}" type="datetimeFigureOut">
               <a:rPr lang="en-GB" smtClean="0"/>
-              <a:t>04/08/2021</a:t>
+              <a:t>06/08/2021</a:t>
             </a:fld>
             <a:endParaRPr lang="en-GB"/>
           </a:p>
@@ -884,7 +884,7 @@
           <a:p>
             <a:fld id="{4E2C61A7-258B-BC4C-BFB2-CEA5AF03893F}" type="datetimeFigureOut">
               <a:rPr lang="en-GB" smtClean="0"/>
-              <a:t>04/08/2021</a:t>
+              <a:t>06/08/2021</a:t>
             </a:fld>
             <a:endParaRPr lang="en-GB"/>
           </a:p>
@@ -1159,7 +1159,7 @@
           <a:p>
             <a:fld id="{4E2C61A7-258B-BC4C-BFB2-CEA5AF03893F}" type="datetimeFigureOut">
               <a:rPr lang="en-GB" smtClean="0"/>
-              <a:t>04/08/2021</a:t>
+              <a:t>06/08/2021</a:t>
             </a:fld>
             <a:endParaRPr lang="en-GB"/>
           </a:p>
@@ -1424,7 +1424,7 @@
           <a:p>
             <a:fld id="{4E2C61A7-258B-BC4C-BFB2-CEA5AF03893F}" type="datetimeFigureOut">
               <a:rPr lang="en-GB" smtClean="0"/>
-              <a:t>04/08/2021</a:t>
+              <a:t>06/08/2021</a:t>
             </a:fld>
             <a:endParaRPr lang="en-GB"/>
           </a:p>
@@ -1836,7 +1836,7 @@
           <a:p>
             <a:fld id="{4E2C61A7-258B-BC4C-BFB2-CEA5AF03893F}" type="datetimeFigureOut">
               <a:rPr lang="en-GB" smtClean="0"/>
-              <a:t>04/08/2021</a:t>
+              <a:t>06/08/2021</a:t>
             </a:fld>
             <a:endParaRPr lang="en-GB"/>
           </a:p>
@@ -1977,7 +1977,7 @@
           <a:p>
             <a:fld id="{4E2C61A7-258B-BC4C-BFB2-CEA5AF03893F}" type="datetimeFigureOut">
               <a:rPr lang="en-GB" smtClean="0"/>
-              <a:t>04/08/2021</a:t>
+              <a:t>06/08/2021</a:t>
             </a:fld>
             <a:endParaRPr lang="en-GB"/>
           </a:p>
@@ -2090,7 +2090,7 @@
           <a:p>
             <a:fld id="{4E2C61A7-258B-BC4C-BFB2-CEA5AF03893F}" type="datetimeFigureOut">
               <a:rPr lang="en-GB" smtClean="0"/>
-              <a:t>04/08/2021</a:t>
+              <a:t>06/08/2021</a:t>
             </a:fld>
             <a:endParaRPr lang="en-GB"/>
           </a:p>
@@ -2401,7 +2401,7 @@
           <a:p>
             <a:fld id="{4E2C61A7-258B-BC4C-BFB2-CEA5AF03893F}" type="datetimeFigureOut">
               <a:rPr lang="en-GB" smtClean="0"/>
-              <a:t>04/08/2021</a:t>
+              <a:t>06/08/2021</a:t>
             </a:fld>
             <a:endParaRPr lang="en-GB"/>
           </a:p>
@@ -2689,7 +2689,7 @@
           <a:p>
             <a:fld id="{4E2C61A7-258B-BC4C-BFB2-CEA5AF03893F}" type="datetimeFigureOut">
               <a:rPr lang="en-GB" smtClean="0"/>
-              <a:t>04/08/2021</a:t>
+              <a:t>06/08/2021</a:t>
             </a:fld>
             <a:endParaRPr lang="en-GB"/>
           </a:p>
@@ -2930,7 +2930,7 @@
           <a:p>
             <a:fld id="{4E2C61A7-258B-BC4C-BFB2-CEA5AF03893F}" type="datetimeFigureOut">
               <a:rPr lang="en-GB" smtClean="0"/>
-              <a:t>04/08/2021</a:t>
+              <a:t>06/08/2021</a:t>
             </a:fld>
             <a:endParaRPr lang="en-GB"/>
           </a:p>
@@ -5243,10 +5243,10 @@
         </p:nvGrpSpPr>
         <p:grpSpPr>
           <a:xfrm>
-            <a:off x="6246812" y="3813175"/>
-            <a:ext cx="348172" cy="255731"/>
-            <a:chOff x="6246812" y="3813175"/>
-            <a:chExt cx="348172" cy="255731"/>
+            <a:off x="6246812" y="3803650"/>
+            <a:ext cx="348172" cy="265256"/>
+            <a:chOff x="6246812" y="3803650"/>
+            <a:chExt cx="348172" cy="265256"/>
           </a:xfrm>
         </p:grpSpPr>
         <p:sp>
@@ -5270,7 +5270,7 @@
               <a:avLst/>
             </a:prstGeom>
             <a:solidFill>
-              <a:srgbClr val="90D2EF"/>
+              <a:srgbClr val="7030A0"/>
             </a:solidFill>
             <a:ln>
               <a:noFill/>
@@ -5298,13 +5298,13 @@
             <a:p>
               <a:pPr algn="ctr"/>
               <a:r>
-                <a:rPr lang="en-GB" sz="600" b="1" dirty="0">
+                <a:rPr lang="en-GB" sz="600" b="1">
                   <a:solidFill>
-                    <a:schemeClr val="tx1"/>
+                    <a:schemeClr val="bg1"/>
                   </a:solidFill>
                   <a:latin typeface="Helvetica" pitchFamily="2" charset="0"/>
                 </a:rPr>
-                <a:t>n</a:t>
+                <a:t>N</a:t>
               </a:r>
             </a:p>
           </p:txBody>
@@ -5323,7 +5323,7 @@
           </p:nvSpPr>
           <p:spPr>
             <a:xfrm>
-              <a:off x="6246812" y="3813175"/>
+              <a:off x="6246812" y="3803650"/>
               <a:ext cx="348172" cy="184666"/>
             </a:xfrm>
             <a:prstGeom prst="rect">
@@ -5338,7 +5338,7 @@
             <a:lstStyle/>
             <a:p>
               <a:r>
-                <a:rPr lang="en-GB" sz="600" dirty="0">
+                <a:rPr lang="en-GB" sz="600">
                   <a:latin typeface="Helvetica" pitchFamily="2" charset="0"/>
                 </a:rPr>
                 <a:t>ccpn</a:t>

</xml_diff>